<commit_message>
update mission and why
</commit_message>
<xml_diff>
--- a/assets/media/logos.pptx
+++ b/assets/media/logos.pptx
@@ -6,6 +6,7 @@
   </p:sldMasterIdLst>
   <p:sldIdLst>
     <p:sldId id="256" r:id="rId2"/>
+    <p:sldId id="257" r:id="rId3"/>
   </p:sldIdLst>
   <p:sldSz cx="12192000" cy="6858000"/>
   <p:notesSz cx="6858000" cy="9144000"/>
@@ -104,6 +105,11 @@
       </a:defRPr>
     </a:lvl9pPr>
   </p:defaultTextStyle>
+  <p:extLst>
+    <p:ext uri="{EFAFB233-063F-42B5-8137-9DF3F51BA10A}">
+      <p15:sldGuideLst xmlns:p15="http://schemas.microsoft.com/office/powerpoint/2012/main"/>
+    </p:ext>
+  </p:extLst>
 </p:presentation>
 </file>
 
@@ -253,7 +259,7 @@
           <a:lstStyle/>
           <a:p>
             <a:fld id="{312DB2FD-E86E-AC49-B2E8-22D29C8A127D}" type="datetimeFigureOut">
-              <a:t>1/9/23</a:t>
+              <a:t>3/21/23</a:t>
             </a:fld>
             <a:endParaRPr lang="en-US"/>
           </a:p>
@@ -449,7 +455,7 @@
           <a:lstStyle/>
           <a:p>
             <a:fld id="{312DB2FD-E86E-AC49-B2E8-22D29C8A127D}" type="datetimeFigureOut">
-              <a:t>1/9/23</a:t>
+              <a:t>3/21/23</a:t>
             </a:fld>
             <a:endParaRPr lang="en-US"/>
           </a:p>
@@ -655,7 +661,7 @@
           <a:lstStyle/>
           <a:p>
             <a:fld id="{312DB2FD-E86E-AC49-B2E8-22D29C8A127D}" type="datetimeFigureOut">
-              <a:t>1/9/23</a:t>
+              <a:t>3/21/23</a:t>
             </a:fld>
             <a:endParaRPr lang="en-US"/>
           </a:p>
@@ -851,7 +857,7 @@
           <a:lstStyle/>
           <a:p>
             <a:fld id="{312DB2FD-E86E-AC49-B2E8-22D29C8A127D}" type="datetimeFigureOut">
-              <a:t>1/9/23</a:t>
+              <a:t>3/21/23</a:t>
             </a:fld>
             <a:endParaRPr lang="en-US"/>
           </a:p>
@@ -1124,7 +1130,7 @@
           <a:lstStyle/>
           <a:p>
             <a:fld id="{312DB2FD-E86E-AC49-B2E8-22D29C8A127D}" type="datetimeFigureOut">
-              <a:t>1/9/23</a:t>
+              <a:t>3/21/23</a:t>
             </a:fld>
             <a:endParaRPr lang="en-US"/>
           </a:p>
@@ -1387,7 +1393,7 @@
           <a:lstStyle/>
           <a:p>
             <a:fld id="{312DB2FD-E86E-AC49-B2E8-22D29C8A127D}" type="datetimeFigureOut">
-              <a:t>1/9/23</a:t>
+              <a:t>3/21/23</a:t>
             </a:fld>
             <a:endParaRPr lang="en-US"/>
           </a:p>
@@ -1797,7 +1803,7 @@
           <a:lstStyle/>
           <a:p>
             <a:fld id="{312DB2FD-E86E-AC49-B2E8-22D29C8A127D}" type="datetimeFigureOut">
-              <a:t>1/9/23</a:t>
+              <a:t>3/21/23</a:t>
             </a:fld>
             <a:endParaRPr lang="en-US"/>
           </a:p>
@@ -1936,7 +1942,7 @@
           <a:lstStyle/>
           <a:p>
             <a:fld id="{312DB2FD-E86E-AC49-B2E8-22D29C8A127D}" type="datetimeFigureOut">
-              <a:t>1/9/23</a:t>
+              <a:t>3/21/23</a:t>
             </a:fld>
             <a:endParaRPr lang="en-US"/>
           </a:p>
@@ -2047,7 +2053,7 @@
           <a:lstStyle/>
           <a:p>
             <a:fld id="{312DB2FD-E86E-AC49-B2E8-22D29C8A127D}" type="datetimeFigureOut">
-              <a:t>1/9/23</a:t>
+              <a:t>3/21/23</a:t>
             </a:fld>
             <a:endParaRPr lang="en-US"/>
           </a:p>
@@ -2356,7 +2362,7 @@
           <a:lstStyle/>
           <a:p>
             <a:fld id="{312DB2FD-E86E-AC49-B2E8-22D29C8A127D}" type="datetimeFigureOut">
-              <a:t>1/9/23</a:t>
+              <a:t>3/21/23</a:t>
             </a:fld>
             <a:endParaRPr lang="en-US"/>
           </a:p>
@@ -2642,7 +2648,7 @@
           <a:lstStyle/>
           <a:p>
             <a:fld id="{312DB2FD-E86E-AC49-B2E8-22D29C8A127D}" type="datetimeFigureOut">
-              <a:t>1/9/23</a:t>
+              <a:t>3/21/23</a:t>
             </a:fld>
             <a:endParaRPr lang="en-US"/>
           </a:p>
@@ -2881,7 +2887,7 @@
           </a:lstStyle>
           <a:p>
             <a:fld id="{312DB2FD-E86E-AC49-B2E8-22D29C8A127D}" type="datetimeFigureOut">
-              <a:t>1/9/23</a:t>
+              <a:t>3/21/23</a:t>
             </a:fld>
             <a:endParaRPr lang="en-US"/>
           </a:p>
@@ -3391,6 +3397,205 @@
 </p:sld>
 </file>
 
+<file path=ppt/slides/slide2.xml><?xml version="1.0" encoding="utf-8"?>
+<p:sld xmlns:a="http://schemas.openxmlformats.org/drawingml/2006/main" xmlns:r="http://schemas.openxmlformats.org/officeDocument/2006/relationships" xmlns:p="http://schemas.openxmlformats.org/presentationml/2006/main">
+  <p:cSld>
+    <p:spTree>
+      <p:nvGrpSpPr>
+        <p:cNvPr id="1" name=""/>
+        <p:cNvGrpSpPr/>
+        <p:nvPr/>
+      </p:nvGrpSpPr>
+      <p:grpSpPr>
+        <a:xfrm>
+          <a:off x="0" y="0"/>
+          <a:ext cx="0" cy="0"/>
+          <a:chOff x="0" y="0"/>
+          <a:chExt cx="0" cy="0"/>
+        </a:xfrm>
+      </p:grpSpPr>
+      <p:grpSp>
+        <p:nvGrpSpPr>
+          <p:cNvPr id="3" name="Group 2">
+            <a:extLst>
+              <a:ext uri="{FF2B5EF4-FFF2-40B4-BE49-F238E27FC236}">
+                <a16:creationId xmlns:a16="http://schemas.microsoft.com/office/drawing/2014/main" id="{C7C52DEF-03C1-4738-5305-731A1C8A4477}"/>
+              </a:ext>
+            </a:extLst>
+          </p:cNvPr>
+          <p:cNvGrpSpPr/>
+          <p:nvPr/>
+        </p:nvGrpSpPr>
+        <p:grpSpPr>
+          <a:xfrm>
+            <a:off x="2196003" y="1811271"/>
+            <a:ext cx="7799991" cy="1617729"/>
+            <a:chOff x="2479127" y="1811271"/>
+            <a:chExt cx="7799991" cy="1617729"/>
+          </a:xfrm>
+        </p:grpSpPr>
+        <p:pic>
+          <p:nvPicPr>
+            <p:cNvPr id="5" name="Picture 4">
+              <a:extLst>
+                <a:ext uri="{FF2B5EF4-FFF2-40B4-BE49-F238E27FC236}">
+                  <a16:creationId xmlns:a16="http://schemas.microsoft.com/office/drawing/2014/main" id="{6B55B3AA-2DDA-F875-460D-F819E1276501}"/>
+                </a:ext>
+              </a:extLst>
+            </p:cNvPr>
+            <p:cNvPicPr>
+              <a:picLocks noChangeAspect="1"/>
+            </p:cNvPicPr>
+            <p:nvPr/>
+          </p:nvPicPr>
+          <p:blipFill>
+            <a:blip r:embed="rId2"/>
+            <a:stretch>
+              <a:fillRect/>
+            </a:stretch>
+          </p:blipFill>
+          <p:spPr>
+            <a:xfrm>
+              <a:off x="2479127" y="1811271"/>
+              <a:ext cx="1854767" cy="1513490"/>
+            </a:xfrm>
+            <a:prstGeom prst="rect">
+              <a:avLst/>
+            </a:prstGeom>
+          </p:spPr>
+        </p:pic>
+        <p:sp>
+          <p:nvSpPr>
+            <p:cNvPr id="6" name="TextBox 5">
+              <a:extLst>
+                <a:ext uri="{FF2B5EF4-FFF2-40B4-BE49-F238E27FC236}">
+                  <a16:creationId xmlns:a16="http://schemas.microsoft.com/office/drawing/2014/main" id="{8F8B63CC-EF44-C3A9-9121-33370A754282}"/>
+                </a:ext>
+              </a:extLst>
+            </p:cNvPr>
+            <p:cNvSpPr txBox="1"/>
+            <p:nvPr/>
+          </p:nvSpPr>
+          <p:spPr>
+            <a:xfrm>
+              <a:off x="4603531" y="2105561"/>
+              <a:ext cx="5675587" cy="1323439"/>
+            </a:xfrm>
+            <a:prstGeom prst="rect">
+              <a:avLst/>
+            </a:prstGeom>
+            <a:noFill/>
+          </p:spPr>
+          <p:txBody>
+            <a:bodyPr wrap="square" rtlCol="0">
+              <a:spAutoFit/>
+            </a:bodyPr>
+            <a:lstStyle/>
+            <a:p>
+              <a:r>
+                <a:rPr lang="en-US" sz="8000" b="1">
+                  <a:solidFill>
+                    <a:srgbClr val="03AEEF"/>
+                  </a:solidFill>
+                  <a:latin typeface="Roboto" panose="02000000000000000000" pitchFamily="2" charset="0"/>
+                  <a:ea typeface="Roboto" panose="02000000000000000000" pitchFamily="2" charset="0"/>
+                </a:rPr>
+                <a:t>Skyhook</a:t>
+              </a:r>
+              <a:r>
+                <a:rPr lang="en-US" sz="8000" b="1">
+                  <a:solidFill>
+                    <a:srgbClr val="444997"/>
+                  </a:solidFill>
+                  <a:latin typeface="Roboto" panose="02000000000000000000" pitchFamily="2" charset="0"/>
+                  <a:ea typeface="Roboto" panose="02000000000000000000" pitchFamily="2" charset="0"/>
+                </a:rPr>
+                <a:t>DM</a:t>
+              </a:r>
+            </a:p>
+          </p:txBody>
+        </p:sp>
+      </p:grpSp>
+      <p:sp>
+        <p:nvSpPr>
+          <p:cNvPr id="2" name="TextBox 1">
+            <a:extLst>
+              <a:ext uri="{FF2B5EF4-FFF2-40B4-BE49-F238E27FC236}">
+                <a16:creationId xmlns:a16="http://schemas.microsoft.com/office/drawing/2014/main" id="{4E671255-ED42-1FA4-162C-0E9531AC47A1}"/>
+              </a:ext>
+            </a:extLst>
+          </p:cNvPr>
+          <p:cNvSpPr txBox="1"/>
+          <p:nvPr/>
+        </p:nvSpPr>
+        <p:spPr>
+          <a:xfrm>
+            <a:off x="3489434" y="3533240"/>
+            <a:ext cx="5213131" cy="646331"/>
+          </a:xfrm>
+          <a:prstGeom prst="rect">
+            <a:avLst/>
+          </a:prstGeom>
+          <a:noFill/>
+        </p:spPr>
+        <p:txBody>
+          <a:bodyPr wrap="square" rtlCol="0">
+            <a:spAutoFit/>
+          </a:bodyPr>
+          <a:lstStyle/>
+          <a:p>
+            <a:pPr algn="ctr"/>
+            <a:r>
+              <a:rPr lang="en-US">
+                <a:solidFill>
+                  <a:schemeClr val="bg2">
+                    <a:lumMod val="50000"/>
+                  </a:schemeClr>
+                </a:solidFill>
+                <a:latin typeface="Roboto" panose="02000000000000000000" pitchFamily="2" charset="0"/>
+                <a:ea typeface="Roboto" panose="02000000000000000000" pitchFamily="2" charset="0"/>
+              </a:rPr>
+              <a:t>Efficient and composable data management</a:t>
+            </a:r>
+            <a:br>
+              <a:rPr lang="en-US">
+                <a:solidFill>
+                  <a:schemeClr val="bg2">
+                    <a:lumMod val="50000"/>
+                  </a:schemeClr>
+                </a:solidFill>
+                <a:latin typeface="Roboto" panose="02000000000000000000" pitchFamily="2" charset="0"/>
+                <a:ea typeface="Roboto" panose="02000000000000000000" pitchFamily="2" charset="0"/>
+              </a:rPr>
+            </a:br>
+            <a:r>
+              <a:rPr lang="en-US">
+                <a:solidFill>
+                  <a:schemeClr val="bg2">
+                    <a:lumMod val="50000"/>
+                  </a:schemeClr>
+                </a:solidFill>
+                <a:latin typeface="Roboto" panose="02000000000000000000" pitchFamily="2" charset="0"/>
+                <a:ea typeface="Roboto" panose="02000000000000000000" pitchFamily="2" charset="0"/>
+              </a:rPr>
+              <a:t>in storage and network layers </a:t>
+            </a:r>
+          </a:p>
+        </p:txBody>
+      </p:sp>
+    </p:spTree>
+    <p:extLst>
+      <p:ext uri="{BB962C8B-B14F-4D97-AF65-F5344CB8AC3E}">
+        <p14:creationId xmlns:p14="http://schemas.microsoft.com/office/powerpoint/2010/main" val="3542309697"/>
+      </p:ext>
+    </p:extLst>
+  </p:cSld>
+  <p:clrMapOvr>
+    <a:masterClrMapping/>
+  </p:clrMapOvr>
+</p:sld>
+</file>
+
 <file path=ppt/theme/theme1.xml><?xml version="1.0" encoding="utf-8"?>
 <a:theme xmlns:a="http://schemas.openxmlformats.org/drawingml/2006/main" name="Office Theme 2013 - 2022">
   <a:themeElements>

</xml_diff>

<commit_message>
add swag logo (#22)
</commit_message>
<xml_diff>
--- a/assets/media/logos.pptx
+++ b/assets/media/logos.pptx
@@ -7,6 +7,7 @@
   <p:sldIdLst>
     <p:sldId id="256" r:id="rId2"/>
     <p:sldId id="257" r:id="rId3"/>
+    <p:sldId id="258" r:id="rId4"/>
   </p:sldIdLst>
   <p:sldSz cx="12192000" cy="6858000"/>
   <p:notesSz cx="6858000" cy="9144000"/>
@@ -259,7 +260,7 @@
           <a:lstStyle/>
           <a:p>
             <a:fld id="{312DB2FD-E86E-AC49-B2E8-22D29C8A127D}" type="datetimeFigureOut">
-              <a:t>3/21/23</a:t>
+              <a:t>8/15/23</a:t>
             </a:fld>
             <a:endParaRPr lang="en-US"/>
           </a:p>
@@ -455,7 +456,7 @@
           <a:lstStyle/>
           <a:p>
             <a:fld id="{312DB2FD-E86E-AC49-B2E8-22D29C8A127D}" type="datetimeFigureOut">
-              <a:t>3/21/23</a:t>
+              <a:t>8/15/23</a:t>
             </a:fld>
             <a:endParaRPr lang="en-US"/>
           </a:p>
@@ -661,7 +662,7 @@
           <a:lstStyle/>
           <a:p>
             <a:fld id="{312DB2FD-E86E-AC49-B2E8-22D29C8A127D}" type="datetimeFigureOut">
-              <a:t>3/21/23</a:t>
+              <a:t>8/15/23</a:t>
             </a:fld>
             <a:endParaRPr lang="en-US"/>
           </a:p>
@@ -857,7 +858,7 @@
           <a:lstStyle/>
           <a:p>
             <a:fld id="{312DB2FD-E86E-AC49-B2E8-22D29C8A127D}" type="datetimeFigureOut">
-              <a:t>3/21/23</a:t>
+              <a:t>8/15/23</a:t>
             </a:fld>
             <a:endParaRPr lang="en-US"/>
           </a:p>
@@ -1130,7 +1131,7 @@
           <a:lstStyle/>
           <a:p>
             <a:fld id="{312DB2FD-E86E-AC49-B2E8-22D29C8A127D}" type="datetimeFigureOut">
-              <a:t>3/21/23</a:t>
+              <a:t>8/15/23</a:t>
             </a:fld>
             <a:endParaRPr lang="en-US"/>
           </a:p>
@@ -1393,7 +1394,7 @@
           <a:lstStyle/>
           <a:p>
             <a:fld id="{312DB2FD-E86E-AC49-B2E8-22D29C8A127D}" type="datetimeFigureOut">
-              <a:t>3/21/23</a:t>
+              <a:t>8/15/23</a:t>
             </a:fld>
             <a:endParaRPr lang="en-US"/>
           </a:p>
@@ -1803,7 +1804,7 @@
           <a:lstStyle/>
           <a:p>
             <a:fld id="{312DB2FD-E86E-AC49-B2E8-22D29C8A127D}" type="datetimeFigureOut">
-              <a:t>3/21/23</a:t>
+              <a:t>8/15/23</a:t>
             </a:fld>
             <a:endParaRPr lang="en-US"/>
           </a:p>
@@ -1942,7 +1943,7 @@
           <a:lstStyle/>
           <a:p>
             <a:fld id="{312DB2FD-E86E-AC49-B2E8-22D29C8A127D}" type="datetimeFigureOut">
-              <a:t>3/21/23</a:t>
+              <a:t>8/15/23</a:t>
             </a:fld>
             <a:endParaRPr lang="en-US"/>
           </a:p>
@@ -2053,7 +2054,7 @@
           <a:lstStyle/>
           <a:p>
             <a:fld id="{312DB2FD-E86E-AC49-B2E8-22D29C8A127D}" type="datetimeFigureOut">
-              <a:t>3/21/23</a:t>
+              <a:t>8/15/23</a:t>
             </a:fld>
             <a:endParaRPr lang="en-US"/>
           </a:p>
@@ -2362,7 +2363,7 @@
           <a:lstStyle/>
           <a:p>
             <a:fld id="{312DB2FD-E86E-AC49-B2E8-22D29C8A127D}" type="datetimeFigureOut">
-              <a:t>3/21/23</a:t>
+              <a:t>8/15/23</a:t>
             </a:fld>
             <a:endParaRPr lang="en-US"/>
           </a:p>
@@ -2648,7 +2649,7 @@
           <a:lstStyle/>
           <a:p>
             <a:fld id="{312DB2FD-E86E-AC49-B2E8-22D29C8A127D}" type="datetimeFigureOut">
-              <a:t>3/21/23</a:t>
+              <a:t>8/15/23</a:t>
             </a:fld>
             <a:endParaRPr lang="en-US"/>
           </a:p>
@@ -2887,7 +2888,7 @@
           </a:lstStyle>
           <a:p>
             <a:fld id="{312DB2FD-E86E-AC49-B2E8-22D29C8A127D}" type="datetimeFigureOut">
-              <a:t>3/21/23</a:t>
+              <a:t>8/15/23</a:t>
             </a:fld>
             <a:endParaRPr lang="en-US"/>
           </a:p>
@@ -3596,6 +3597,159 @@
 </p:sld>
 </file>
 
+<file path=ppt/slides/slide3.xml><?xml version="1.0" encoding="utf-8"?>
+<p:sld xmlns:a="http://schemas.openxmlformats.org/drawingml/2006/main" xmlns:r="http://schemas.openxmlformats.org/officeDocument/2006/relationships" xmlns:p="http://schemas.openxmlformats.org/presentationml/2006/main">
+  <p:cSld>
+    <p:spTree>
+      <p:nvGrpSpPr>
+        <p:cNvPr id="1" name=""/>
+        <p:cNvGrpSpPr/>
+        <p:nvPr/>
+      </p:nvGrpSpPr>
+      <p:grpSpPr>
+        <a:xfrm>
+          <a:off x="0" y="0"/>
+          <a:ext cx="0" cy="0"/>
+          <a:chOff x="0" y="0"/>
+          <a:chExt cx="0" cy="0"/>
+        </a:xfrm>
+      </p:grpSpPr>
+      <p:pic>
+        <p:nvPicPr>
+          <p:cNvPr id="5" name="Picture 4">
+            <a:extLst>
+              <a:ext uri="{FF2B5EF4-FFF2-40B4-BE49-F238E27FC236}">
+                <a16:creationId xmlns:a16="http://schemas.microsoft.com/office/drawing/2014/main" id="{6B55B3AA-2DDA-F875-460D-F819E1276501}"/>
+              </a:ext>
+            </a:extLst>
+          </p:cNvPr>
+          <p:cNvPicPr>
+            <a:picLocks noChangeAspect="1"/>
+          </p:cNvPicPr>
+          <p:nvPr/>
+        </p:nvPicPr>
+        <p:blipFill>
+          <a:blip r:embed="rId2"/>
+          <a:stretch>
+            <a:fillRect/>
+          </a:stretch>
+        </p:blipFill>
+        <p:spPr>
+          <a:xfrm>
+            <a:off x="2470240" y="2305257"/>
+            <a:ext cx="1854767" cy="1513490"/>
+          </a:xfrm>
+          <a:prstGeom prst="rect">
+            <a:avLst/>
+          </a:prstGeom>
+        </p:spPr>
+      </p:pic>
+      <p:sp>
+        <p:nvSpPr>
+          <p:cNvPr id="6" name="TextBox 5">
+            <a:extLst>
+              <a:ext uri="{FF2B5EF4-FFF2-40B4-BE49-F238E27FC236}">
+                <a16:creationId xmlns:a16="http://schemas.microsoft.com/office/drawing/2014/main" id="{8F8B63CC-EF44-C3A9-9121-33370A754282}"/>
+              </a:ext>
+            </a:extLst>
+          </p:cNvPr>
+          <p:cNvSpPr txBox="1"/>
+          <p:nvPr/>
+        </p:nvSpPr>
+        <p:spPr>
+          <a:xfrm>
+            <a:off x="4603531" y="2105561"/>
+            <a:ext cx="5675587" cy="1323439"/>
+          </a:xfrm>
+          <a:prstGeom prst="rect">
+            <a:avLst/>
+          </a:prstGeom>
+          <a:noFill/>
+        </p:spPr>
+        <p:txBody>
+          <a:bodyPr wrap="square" rtlCol="0">
+            <a:spAutoFit/>
+          </a:bodyPr>
+          <a:lstStyle/>
+          <a:p>
+            <a:r>
+              <a:rPr lang="en-US" sz="8000" b="1">
+                <a:solidFill>
+                  <a:srgbClr val="03AEEF"/>
+                </a:solidFill>
+                <a:latin typeface="Roboto" panose="02000000000000000000" pitchFamily="2" charset="0"/>
+                <a:ea typeface="Roboto" panose="02000000000000000000" pitchFamily="2" charset="0"/>
+              </a:rPr>
+              <a:t>Skyhook</a:t>
+            </a:r>
+            <a:r>
+              <a:rPr lang="en-US" sz="8000" b="1">
+                <a:solidFill>
+                  <a:srgbClr val="444997"/>
+                </a:solidFill>
+                <a:latin typeface="Roboto" panose="02000000000000000000" pitchFamily="2" charset="0"/>
+                <a:ea typeface="Roboto" panose="02000000000000000000" pitchFamily="2" charset="0"/>
+              </a:rPr>
+              <a:t>DM</a:t>
+            </a:r>
+          </a:p>
+        </p:txBody>
+      </p:sp>
+      <p:sp>
+        <p:nvSpPr>
+          <p:cNvPr id="2" name="TextBox 1">
+            <a:extLst>
+              <a:ext uri="{FF2B5EF4-FFF2-40B4-BE49-F238E27FC236}">
+                <a16:creationId xmlns:a16="http://schemas.microsoft.com/office/drawing/2014/main" id="{38825CE5-BFB0-DD09-9565-84654DCDCF8D}"/>
+              </a:ext>
+            </a:extLst>
+          </p:cNvPr>
+          <p:cNvSpPr txBox="1"/>
+          <p:nvPr/>
+        </p:nvSpPr>
+        <p:spPr>
+          <a:xfrm>
+            <a:off x="4046484" y="3324761"/>
+            <a:ext cx="6232634" cy="800219"/>
+          </a:xfrm>
+          <a:prstGeom prst="rect">
+            <a:avLst/>
+          </a:prstGeom>
+          <a:noFill/>
+        </p:spPr>
+        <p:txBody>
+          <a:bodyPr wrap="square" rtlCol="0">
+            <a:spAutoFit/>
+          </a:bodyPr>
+          <a:lstStyle/>
+          <a:p>
+            <a:pPr algn="r"/>
+            <a:r>
+              <a:rPr lang="en-US" sz="4600">
+                <a:solidFill>
+                  <a:schemeClr val="accent3"/>
+                </a:solidFill>
+                <a:latin typeface="Roboto" panose="02000000000000000000" pitchFamily="2" charset="0"/>
+                <a:ea typeface="Roboto" panose="02000000000000000000" pitchFamily="2" charset="0"/>
+              </a:rPr>
+              <a:t>skyhookdm.github.io</a:t>
+            </a:r>
+          </a:p>
+        </p:txBody>
+      </p:sp>
+    </p:spTree>
+    <p:extLst>
+      <p:ext uri="{BB962C8B-B14F-4D97-AF65-F5344CB8AC3E}">
+        <p14:creationId xmlns:p14="http://schemas.microsoft.com/office/powerpoint/2010/main" val="1374221260"/>
+      </p:ext>
+    </p:extLst>
+  </p:cSld>
+  <p:clrMapOvr>
+    <a:masterClrMapping/>
+  </p:clrMapOvr>
+</p:sld>
+</file>
+
 <file path=ppt/theme/theme1.xml><?xml version="1.0" encoding="utf-8"?>
 <a:theme xmlns:a="http://schemas.openxmlformats.org/drawingml/2006/main" name="Office Theme 2013 - 2022">
   <a:themeElements>

</xml_diff>